<commit_message>
1) Adding the imgui library 2) Make Default Screen
</commit_message>
<xml_diff>
--- a/Architecture.pptx
+++ b/Architecture.pptx
@@ -114,20 +114,12 @@
 </p:presentation>
 </file>
 
-<file path=ppt/revisionInfo.xml><?xml version="1.0" encoding="utf-8"?>
-<p1510:revInfo xmlns:a="http://schemas.openxmlformats.org/drawingml/2006/main" xmlns:r="http://schemas.openxmlformats.org/officeDocument/2006/relationships" xmlns:p1510="http://schemas.microsoft.com/office/powerpoint/2015/10/main">
-  <p1510:revLst>
-    <p1510:client id="{235F9050-C1F4-477C-BCA3-CCAA7E120D88}" v="89" dt="2024-12-11T11:22:10.108"/>
-  </p1510:revLst>
-</p1510:revInfo>
-</file>
-
 <file path=ppt/changesInfos/changesInfo1.xml><?xml version="1.0" encoding="utf-8"?>
 <pc:chgInfo xmlns:a="http://schemas.openxmlformats.org/drawingml/2006/main" xmlns:r="http://schemas.openxmlformats.org/officeDocument/2006/relationships" xmlns:ac="http://schemas.microsoft.com/office/drawing/2013/main/command" xmlns:pc="http://schemas.microsoft.com/office/powerpoint/2013/main/command">
   <pc:docChgLst>
     <pc:chgData name="seungkyun park" userId="f1574e86df6b37cf" providerId="LiveId" clId="{7CCF9389-FC57-442E-8C8F-013ED0D606B0}"/>
-    <pc:docChg chg="delSld modSld delMainMaster">
-      <pc:chgData name="seungkyun park" userId="f1574e86df6b37cf" providerId="LiveId" clId="{7CCF9389-FC57-442E-8C8F-013ED0D606B0}" dt="2024-12-11T16:54:01.378" v="21" actId="20577"/>
+    <pc:docChg chg="custSel delSld modSld delMainMaster">
+      <pc:chgData name="seungkyun park" userId="f1574e86df6b37cf" providerId="LiveId" clId="{7CCF9389-FC57-442E-8C8F-013ED0D606B0}" dt="2024-12-12T13:56:58.043" v="22" actId="478"/>
       <pc:docMkLst>
         <pc:docMk/>
       </pc:docMkLst>
@@ -210,14 +202,14 @@
           <pc:sldMk cId="395285393" sldId="271"/>
         </pc:sldMkLst>
       </pc:sldChg>
-      <pc:sldChg chg="addSp modSp mod">
-        <pc:chgData name="seungkyun park" userId="f1574e86df6b37cf" providerId="LiveId" clId="{7CCF9389-FC57-442E-8C8F-013ED0D606B0}" dt="2024-12-11T16:54:01.378" v="21" actId="20577"/>
+      <pc:sldChg chg="addSp delSp modSp mod">
+        <pc:chgData name="seungkyun park" userId="f1574e86df6b37cf" providerId="LiveId" clId="{7CCF9389-FC57-442E-8C8F-013ED0D606B0}" dt="2024-12-12T13:56:58.043" v="22" actId="478"/>
         <pc:sldMkLst>
           <pc:docMk/>
           <pc:sldMk cId="68514707" sldId="280"/>
         </pc:sldMkLst>
-        <pc:spChg chg="add mod">
-          <ac:chgData name="seungkyun park" userId="f1574e86df6b37cf" providerId="LiveId" clId="{7CCF9389-FC57-442E-8C8F-013ED0D606B0}" dt="2024-12-11T16:54:01.378" v="21" actId="20577"/>
+        <pc:spChg chg="add del mod">
+          <ac:chgData name="seungkyun park" userId="f1574e86df6b37cf" providerId="LiveId" clId="{7CCF9389-FC57-442E-8C8F-013ED0D606B0}" dt="2024-12-12T13:56:58.043" v="22" actId="478"/>
           <ac:spMkLst>
             <pc:docMk/>
             <pc:sldMk cId="68514707" sldId="280"/>
@@ -10872,56 +10864,6 @@
               </a:rPr>
               <a:t>TBD….</a:t>
             </a:r>
-          </a:p>
-        </p:txBody>
-      </p:sp>
-      <p:sp>
-        <p:nvSpPr>
-          <p:cNvPr id="5" name="직사각형 4">
-            <a:extLst>
-              <a:ext uri="{FF2B5EF4-FFF2-40B4-BE49-F238E27FC236}">
-                <a16:creationId xmlns:a16="http://schemas.microsoft.com/office/drawing/2014/main" id="{E10E8D7A-FD3F-75ED-B685-E302E73FB589}"/>
-              </a:ext>
-            </a:extLst>
-          </p:cNvPr>
-          <p:cNvSpPr/>
-          <p:nvPr/>
-        </p:nvSpPr>
-        <p:spPr>
-          <a:xfrm>
-            <a:off x="-229625" y="467451"/>
-            <a:ext cx="10640664" cy="6507412"/>
-          </a:xfrm>
-          <a:prstGeom prst="rect">
-            <a:avLst/>
-          </a:prstGeom>
-        </p:spPr>
-        <p:style>
-          <a:lnRef idx="2">
-            <a:schemeClr val="accent1">
-              <a:shade val="15000"/>
-            </a:schemeClr>
-          </a:lnRef>
-          <a:fillRef idx="1">
-            <a:schemeClr val="accent1"/>
-          </a:fillRef>
-          <a:effectRef idx="0">
-            <a:schemeClr val="accent1"/>
-          </a:effectRef>
-          <a:fontRef idx="minor">
-            <a:schemeClr val="lt1"/>
-          </a:fontRef>
-        </p:style>
-        <p:txBody>
-          <a:bodyPr rtlCol="0" anchor="ctr"/>
-          <a:lstStyle/>
-          <a:p>
-            <a:pPr algn="ctr"/>
-            <a:r>
-              <a:rPr lang="en-US" altLang="ko-KR"/>
-              <a:t>TBD</a:t>
-            </a:r>
-            <a:endParaRPr lang="ko-KR" altLang="en-US"/>
           </a:p>
         </p:txBody>
       </p:sp>

</xml_diff>